<commit_message>
Documentation and project report
</commit_message>
<xml_diff>
--- a/presentation.pptx
+++ b/presentation.pptx
@@ -466,7 +466,7 @@
           <a:p>
             <a:fld id="{D8621C05-7EE5-4B4C-8653-D60680ABA967}" type="datetimeFigureOut">
               <a:rPr lang="en-US" smtClean="0"/>
-              <a:t>6/28/2021</a:t>
+              <a:t>7/4/2021</a:t>
             </a:fld>
             <a:endParaRPr lang="en-US"/>
           </a:p>
@@ -790,7 +790,7 @@
           <a:p>
             <a:fld id="{D8621C05-7EE5-4B4C-8653-D60680ABA967}" type="datetimeFigureOut">
               <a:rPr lang="en-US" smtClean="0"/>
-              <a:t>6/28/2021</a:t>
+              <a:t>7/4/2021</a:t>
             </a:fld>
             <a:endParaRPr lang="en-US"/>
           </a:p>
@@ -1038,7 +1038,7 @@
           <a:p>
             <a:fld id="{D8621C05-7EE5-4B4C-8653-D60680ABA967}" type="datetimeFigureOut">
               <a:rPr lang="en-US" smtClean="0"/>
-              <a:t>6/28/2021</a:t>
+              <a:t>7/4/2021</a:t>
             </a:fld>
             <a:endParaRPr lang="en-US"/>
           </a:p>
@@ -1377,7 +1377,7 @@
           <a:p>
             <a:fld id="{D8621C05-7EE5-4B4C-8653-D60680ABA967}" type="datetimeFigureOut">
               <a:rPr lang="en-US" smtClean="0"/>
-              <a:t>6/28/2021</a:t>
+              <a:t>7/4/2021</a:t>
             </a:fld>
             <a:endParaRPr lang="en-US"/>
           </a:p>
@@ -1724,7 +1724,7 @@
           <a:p>
             <a:fld id="{D8621C05-7EE5-4B4C-8653-D60680ABA967}" type="datetimeFigureOut">
               <a:rPr lang="en-US" smtClean="0"/>
-              <a:t>6/28/2021</a:t>
+              <a:t>7/4/2021</a:t>
             </a:fld>
             <a:endParaRPr lang="en-US"/>
           </a:p>
@@ -2098,7 +2098,7 @@
           <a:p>
             <a:fld id="{D8621C05-7EE5-4B4C-8653-D60680ABA967}" type="datetimeFigureOut">
               <a:rPr lang="en-US" smtClean="0"/>
-              <a:t>6/28/2021</a:t>
+              <a:t>7/4/2021</a:t>
             </a:fld>
             <a:endParaRPr lang="en-US"/>
           </a:p>
@@ -2568,7 +2568,7 @@
           <a:p>
             <a:fld id="{D8621C05-7EE5-4B4C-8653-D60680ABA967}" type="datetimeFigureOut">
               <a:rPr lang="en-US" smtClean="0"/>
-              <a:t>6/28/2021</a:t>
+              <a:t>7/4/2021</a:t>
             </a:fld>
             <a:endParaRPr lang="en-US"/>
           </a:p>
@@ -2778,7 +2778,7 @@
           <a:p>
             <a:fld id="{D8621C05-7EE5-4B4C-8653-D60680ABA967}" type="datetimeFigureOut">
               <a:rPr lang="en-US" smtClean="0"/>
-              <a:t>6/28/2021</a:t>
+              <a:t>7/4/2021</a:t>
             </a:fld>
             <a:endParaRPr lang="en-US"/>
           </a:p>
@@ -2989,7 +2989,7 @@
           <a:p>
             <a:fld id="{D8621C05-7EE5-4B4C-8653-D60680ABA967}" type="datetimeFigureOut">
               <a:rPr lang="en-US" smtClean="0"/>
-              <a:t>6/28/2021</a:t>
+              <a:t>7/4/2021</a:t>
             </a:fld>
             <a:endParaRPr lang="en-US"/>
           </a:p>
@@ -3221,7 +3221,7 @@
           <a:p>
             <a:fld id="{D8621C05-7EE5-4B4C-8653-D60680ABA967}" type="datetimeFigureOut">
               <a:rPr lang="en-US" smtClean="0"/>
-              <a:t>6/28/2021</a:t>
+              <a:t>7/4/2021</a:t>
             </a:fld>
             <a:endParaRPr lang="en-US"/>
           </a:p>
@@ -3469,7 +3469,7 @@
           <a:p>
             <a:fld id="{D8621C05-7EE5-4B4C-8653-D60680ABA967}" type="datetimeFigureOut">
               <a:rPr lang="en-US" smtClean="0"/>
-              <a:t>6/28/2021</a:t>
+              <a:t>7/4/2021</a:t>
             </a:fld>
             <a:endParaRPr lang="en-US"/>
           </a:p>
@@ -3772,7 +3772,7 @@
           <a:p>
             <a:fld id="{D8621C05-7EE5-4B4C-8653-D60680ABA967}" type="datetimeFigureOut">
               <a:rPr lang="en-US" smtClean="0"/>
-              <a:t>6/28/2021</a:t>
+              <a:t>7/4/2021</a:t>
             </a:fld>
             <a:endParaRPr lang="en-US"/>
           </a:p>
@@ -4154,7 +4154,7 @@
           <a:p>
             <a:fld id="{D8621C05-7EE5-4B4C-8653-D60680ABA967}" type="datetimeFigureOut">
               <a:rPr lang="en-US" smtClean="0"/>
-              <a:t>6/28/2021</a:t>
+              <a:t>7/4/2021</a:t>
             </a:fld>
             <a:endParaRPr lang="en-US"/>
           </a:p>
@@ -4308,7 +4308,7 @@
           <a:p>
             <a:fld id="{D8621C05-7EE5-4B4C-8653-D60680ABA967}" type="datetimeFigureOut">
               <a:rPr lang="en-US" smtClean="0"/>
-              <a:t>6/28/2021</a:t>
+              <a:t>7/4/2021</a:t>
             </a:fld>
             <a:endParaRPr lang="en-US"/>
           </a:p>
@@ -4434,7 +4434,7 @@
           <a:p>
             <a:fld id="{D8621C05-7EE5-4B4C-8653-D60680ABA967}" type="datetimeFigureOut">
               <a:rPr lang="en-US" smtClean="0"/>
-              <a:t>6/28/2021</a:t>
+              <a:t>7/4/2021</a:t>
             </a:fld>
             <a:endParaRPr lang="en-US"/>
           </a:p>
@@ -4689,7 +4689,7 @@
           <a:p>
             <a:fld id="{D8621C05-7EE5-4B4C-8653-D60680ABA967}" type="datetimeFigureOut">
               <a:rPr lang="en-US" smtClean="0"/>
-              <a:t>6/28/2021</a:t>
+              <a:t>7/4/2021</a:t>
             </a:fld>
             <a:endParaRPr lang="en-US"/>
           </a:p>
@@ -5003,7 +5003,7 @@
           <a:p>
             <a:fld id="{D8621C05-7EE5-4B4C-8653-D60680ABA967}" type="datetimeFigureOut">
               <a:rPr lang="en-US" smtClean="0"/>
-              <a:t>6/28/2021</a:t>
+              <a:t>7/4/2021</a:t>
             </a:fld>
             <a:endParaRPr lang="en-US"/>
           </a:p>
@@ -5354,7 +5354,7 @@
           <a:p>
             <a:fld id="{D8621C05-7EE5-4B4C-8653-D60680ABA967}" type="datetimeFigureOut">
               <a:rPr lang="en-US" smtClean="0"/>
-              <a:t>6/28/2021</a:t>
+              <a:t>7/4/2021</a:t>
             </a:fld>
             <a:endParaRPr lang="en-US"/>
           </a:p>
@@ -7723,21 +7723,28 @@
                 <a:latin typeface="Times New Roman" pitchFamily="18" charset="0"/>
                 <a:cs typeface="Times New Roman" pitchFamily="18" charset="0"/>
               </a:rPr>
-              <a:t> GUI toolkit. It is the standard Python interface to the </a:t>
-            </a:r>
-            <a:r>
-              <a:rPr lang="en-US" sz="1600" dirty="0" err="1">
+              <a:t> GUI toolkit. It is the standard Python interface to </a:t>
+            </a:r>
+            <a:r>
+              <a:rPr lang="en-US" sz="1600">
                 <a:latin typeface="Times New Roman" pitchFamily="18" charset="0"/>
                 <a:cs typeface="Times New Roman" pitchFamily="18" charset="0"/>
               </a:rPr>
-              <a:t>Tk</a:t>
+              <a:t>the </a:t>
+            </a:r>
+            <a:r>
+              <a:rPr lang="en-US" sz="1600" smtClean="0">
+                <a:latin typeface="Times New Roman" pitchFamily="18" charset="0"/>
+                <a:cs typeface="Times New Roman" pitchFamily="18" charset="0"/>
+              </a:rPr>
+              <a:t>TK </a:t>
             </a:r>
             <a:r>
               <a:rPr lang="en-US" sz="1600" dirty="0">
                 <a:latin typeface="Times New Roman" pitchFamily="18" charset="0"/>
                 <a:cs typeface="Times New Roman" pitchFamily="18" charset="0"/>
               </a:rPr>
-              <a:t> GUI </a:t>
+              <a:t>GUI </a:t>
             </a:r>
             <a:r>
               <a:rPr lang="en-US" sz="1600" dirty="0" smtClean="0">

</xml_diff>